<commit_message>
dernière modif des maquettes
</commit_message>
<xml_diff>
--- a/Maquette_app_soirée.pptx
+++ b/Maquette_app_soirée.pptx
@@ -104,6 +104,11 @@
       </a:defRPr>
     </a:lvl9pPr>
   </p:defaultTextStyle>
+  <p:extLst>
+    <p:ext uri="{EFAFB233-063F-42B5-8137-9DF3F51BA10A}">
+      <p15:sldGuideLst xmlns:p15="http://schemas.microsoft.com/office/powerpoint/2012/main"/>
+    </p:ext>
+  </p:extLst>
 </p:presentation>
 </file>
 
@@ -122,7 +127,7 @@
 <file path=ppt/revisionInfo.xml><?xml version="1.0" encoding="utf-8"?>
 <p1510:revInfo xmlns:a="http://schemas.openxmlformats.org/drawingml/2006/main" xmlns:r="http://schemas.openxmlformats.org/officeDocument/2006/relationships" xmlns:p1510="http://schemas.microsoft.com/office/powerpoint/2015/10/main">
   <p1510:revLst>
-    <p1510:client id="{A53AC63B-8F2B-4738-A51B-5A7B4A9C6A10}" v="94" dt="2021-02-03T18:48:00.184"/>
+    <p1510:client id="{B87CA29C-9854-47B7-9329-B5CF03694B08}" v="1" dt="2021-02-12T08:11:25.431"/>
   </p1510:revLst>
 </p1510:revInfo>
 </file>
@@ -1030,6 +1035,206 @@
             <ac:cxnSpMk id="1052" creationId="{7A8B846E-D859-44BC-9C9A-26EEC4629B51}"/>
           </ac:cxnSpMkLst>
         </pc:cxnChg>
+      </pc:sldChg>
+    </pc:docChg>
+  </pc:docChgLst>
+  <pc:docChgLst>
+    <pc:chgData name="jérémie kuperblum" userId="ad9297b144f2de4c" providerId="LiveId" clId="{B87CA29C-9854-47B7-9329-B5CF03694B08}"/>
+    <pc:docChg chg="undo custSel modSld">
+      <pc:chgData name="jérémie kuperblum" userId="ad9297b144f2de4c" providerId="LiveId" clId="{B87CA29C-9854-47B7-9329-B5CF03694B08}" dt="2021-02-12T08:13:25.728" v="117" actId="20577"/>
+      <pc:docMkLst>
+        <pc:docMk/>
+      </pc:docMkLst>
+      <pc:sldChg chg="addSp modSp mod">
+        <pc:chgData name="jérémie kuperblum" userId="ad9297b144f2de4c" providerId="LiveId" clId="{B87CA29C-9854-47B7-9329-B5CF03694B08}" dt="2021-02-12T08:13:25.728" v="117" actId="20577"/>
+        <pc:sldMkLst>
+          <pc:docMk/>
+          <pc:sldMk cId="3086406202" sldId="256"/>
+        </pc:sldMkLst>
+        <pc:spChg chg="mod">
+          <ac:chgData name="jérémie kuperblum" userId="ad9297b144f2de4c" providerId="LiveId" clId="{B87CA29C-9854-47B7-9329-B5CF03694B08}" dt="2021-02-12T08:05:45.080" v="7" actId="20577"/>
+          <ac:spMkLst>
+            <pc:docMk/>
+            <pc:sldMk cId="3086406202" sldId="256"/>
+            <ac:spMk id="21" creationId="{D099E6BF-C4F2-45FD-B6DF-ED97E51B6861}"/>
+          </ac:spMkLst>
+        </pc:spChg>
+        <pc:spChg chg="mod">
+          <ac:chgData name="jérémie kuperblum" userId="ad9297b144f2de4c" providerId="LiveId" clId="{B87CA29C-9854-47B7-9329-B5CF03694B08}" dt="2021-02-12T08:12:26.589" v="116" actId="20577"/>
+          <ac:spMkLst>
+            <pc:docMk/>
+            <pc:sldMk cId="3086406202" sldId="256"/>
+            <ac:spMk id="34" creationId="{548A9423-F281-4728-A6AB-E349E707AE61}"/>
+          </ac:spMkLst>
+        </pc:spChg>
+        <pc:spChg chg="mod">
+          <ac:chgData name="jérémie kuperblum" userId="ad9297b144f2de4c" providerId="LiveId" clId="{B87CA29C-9854-47B7-9329-B5CF03694B08}" dt="2021-02-12T08:05:33.532" v="5" actId="20577"/>
+          <ac:spMkLst>
+            <pc:docMk/>
+            <pc:sldMk cId="3086406202" sldId="256"/>
+            <ac:spMk id="49" creationId="{9310BD20-B104-47DF-9DD6-9B3559679D29}"/>
+          </ac:spMkLst>
+        </pc:spChg>
+        <pc:spChg chg="mod">
+          <ac:chgData name="jérémie kuperblum" userId="ad9297b144f2de4c" providerId="LiveId" clId="{B87CA29C-9854-47B7-9329-B5CF03694B08}" dt="2021-02-12T08:05:30.491" v="3" actId="20577"/>
+          <ac:spMkLst>
+            <pc:docMk/>
+            <pc:sldMk cId="3086406202" sldId="256"/>
+            <ac:spMk id="50" creationId="{7DF3A5EA-26AF-4C83-8B7C-BC081D9789D4}"/>
+          </ac:spMkLst>
+        </pc:spChg>
+        <pc:spChg chg="mod">
+          <ac:chgData name="jérémie kuperblum" userId="ad9297b144f2de4c" providerId="LiveId" clId="{B87CA29C-9854-47B7-9329-B5CF03694B08}" dt="2021-02-12T08:05:34.715" v="6" actId="20577"/>
+          <ac:spMkLst>
+            <pc:docMk/>
+            <pc:sldMk cId="3086406202" sldId="256"/>
+            <ac:spMk id="51" creationId="{045C9853-CE30-469E-9D6B-E7981247C60F}"/>
+          </ac:spMkLst>
+        </pc:spChg>
+        <pc:spChg chg="mod">
+          <ac:chgData name="jérémie kuperblum" userId="ad9297b144f2de4c" providerId="LiveId" clId="{B87CA29C-9854-47B7-9329-B5CF03694B08}" dt="2021-02-12T08:05:29.078" v="2" actId="20577"/>
+          <ac:spMkLst>
+            <pc:docMk/>
+            <pc:sldMk cId="3086406202" sldId="256"/>
+            <ac:spMk id="56" creationId="{68CE03BA-5950-4F65-9430-8A637FB0E727}"/>
+          </ac:spMkLst>
+        </pc:spChg>
+        <pc:spChg chg="mod">
+          <ac:chgData name="jérémie kuperblum" userId="ad9297b144f2de4c" providerId="LiveId" clId="{B87CA29C-9854-47B7-9329-B5CF03694B08}" dt="2021-02-12T08:05:27.380" v="1" actId="20577"/>
+          <ac:spMkLst>
+            <pc:docMk/>
+            <pc:sldMk cId="3086406202" sldId="256"/>
+            <ac:spMk id="57" creationId="{9944358A-E1C6-4A9C-AC84-BBD66D6FC669}"/>
+          </ac:spMkLst>
+        </pc:spChg>
+        <pc:spChg chg="mod">
+          <ac:chgData name="jérémie kuperblum" userId="ad9297b144f2de4c" providerId="LiveId" clId="{B87CA29C-9854-47B7-9329-B5CF03694B08}" dt="2021-02-12T08:05:24.884" v="0" actId="20577"/>
+          <ac:spMkLst>
+            <pc:docMk/>
+            <pc:sldMk cId="3086406202" sldId="256"/>
+            <ac:spMk id="58" creationId="{993FE81A-3686-4DD2-B0C8-14719985B2FB}"/>
+          </ac:spMkLst>
+        </pc:spChg>
+        <pc:spChg chg="mod">
+          <ac:chgData name="jérémie kuperblum" userId="ad9297b144f2de4c" providerId="LiveId" clId="{B87CA29C-9854-47B7-9329-B5CF03694B08}" dt="2021-02-12T08:08:30.885" v="31" actId="20577"/>
+          <ac:spMkLst>
+            <pc:docMk/>
+            <pc:sldMk cId="3086406202" sldId="256"/>
+            <ac:spMk id="65" creationId="{20E7E78A-69D7-4568-8664-394AF629C2D9}"/>
+          </ac:spMkLst>
+        </pc:spChg>
+        <pc:spChg chg="mod">
+          <ac:chgData name="jérémie kuperblum" userId="ad9297b144f2de4c" providerId="LiveId" clId="{B87CA29C-9854-47B7-9329-B5CF03694B08}" dt="2021-02-12T08:09:28.396" v="40" actId="1076"/>
+          <ac:spMkLst>
+            <pc:docMk/>
+            <pc:sldMk cId="3086406202" sldId="256"/>
+            <ac:spMk id="95" creationId="{2A02F61E-E05E-442B-B3B3-6E83F1FC9E74}"/>
+          </ac:spMkLst>
+        </pc:spChg>
+        <pc:spChg chg="mod">
+          <ac:chgData name="jérémie kuperblum" userId="ad9297b144f2de4c" providerId="LiveId" clId="{B87CA29C-9854-47B7-9329-B5CF03694B08}" dt="2021-02-12T08:13:25.728" v="117" actId="20577"/>
+          <ac:spMkLst>
+            <pc:docMk/>
+            <pc:sldMk cId="3086406202" sldId="256"/>
+            <ac:spMk id="110" creationId="{332E15A8-E241-4A8E-BCA4-70AAE1FB4DA2}"/>
+          </ac:spMkLst>
+        </pc:spChg>
+        <pc:spChg chg="mod">
+          <ac:chgData name="jérémie kuperblum" userId="ad9297b144f2de4c" providerId="LiveId" clId="{B87CA29C-9854-47B7-9329-B5CF03694B08}" dt="2021-02-12T08:06:27.756" v="9" actId="1076"/>
+          <ac:spMkLst>
+            <pc:docMk/>
+            <pc:sldMk cId="3086406202" sldId="256"/>
+            <ac:spMk id="112" creationId="{9284D031-2D64-44B0-BB48-8F41E72FB7D3}"/>
+          </ac:spMkLst>
+        </pc:spChg>
+        <pc:spChg chg="mod">
+          <ac:chgData name="jérémie kuperblum" userId="ad9297b144f2de4c" providerId="LiveId" clId="{B87CA29C-9854-47B7-9329-B5CF03694B08}" dt="2021-02-12T08:05:31.868" v="4" actId="20577"/>
+          <ac:spMkLst>
+            <pc:docMk/>
+            <pc:sldMk cId="3086406202" sldId="256"/>
+            <ac:spMk id="1039" creationId="{1752D39B-3F7E-4626-8282-8E099FABBAFF}"/>
+          </ac:spMkLst>
+        </pc:spChg>
+        <pc:spChg chg="mod">
+          <ac:chgData name="jérémie kuperblum" userId="ad9297b144f2de4c" providerId="LiveId" clId="{B87CA29C-9854-47B7-9329-B5CF03694B08}" dt="2021-02-12T08:11:58.669" v="115" actId="20577"/>
+          <ac:spMkLst>
+            <pc:docMk/>
+            <pc:sldMk cId="3086406202" sldId="256"/>
+            <ac:spMk id="1048" creationId="{7B0A8A33-5E20-4EAE-932A-E8915E1085A2}"/>
+          </ac:spMkLst>
+        </pc:spChg>
+        <pc:picChg chg="mod">
+          <ac:chgData name="jérémie kuperblum" userId="ad9297b144f2de4c" providerId="LiveId" clId="{B87CA29C-9854-47B7-9329-B5CF03694B08}" dt="2021-02-12T08:08:39.355" v="32" actId="1076"/>
+          <ac:picMkLst>
+            <pc:docMk/>
+            <pc:sldMk cId="3086406202" sldId="256"/>
+            <ac:picMk id="5" creationId="{FDBFA001-9A32-4E0B-A281-7F1A5D5358EC}"/>
+          </ac:picMkLst>
+        </pc:picChg>
+        <pc:picChg chg="mod">
+          <ac:chgData name="jérémie kuperblum" userId="ad9297b144f2de4c" providerId="LiveId" clId="{B87CA29C-9854-47B7-9329-B5CF03694B08}" dt="2021-02-12T08:11:22.945" v="109" actId="1076"/>
+          <ac:picMkLst>
+            <pc:docMk/>
+            <pc:sldMk cId="3086406202" sldId="256"/>
+            <ac:picMk id="37" creationId="{86C63347-8214-463C-8B4A-86CA685DC952}"/>
+          </ac:picMkLst>
+        </pc:picChg>
+        <pc:picChg chg="add mod">
+          <ac:chgData name="jérémie kuperblum" userId="ad9297b144f2de4c" providerId="LiveId" clId="{B87CA29C-9854-47B7-9329-B5CF03694B08}" dt="2021-02-12T08:11:28.832" v="111" actId="1076"/>
+          <ac:picMkLst>
+            <pc:docMk/>
+            <pc:sldMk cId="3086406202" sldId="256"/>
+            <ac:picMk id="97" creationId="{984DE0A4-93D1-403C-881B-8D8B6A10C41F}"/>
+          </ac:picMkLst>
+        </pc:picChg>
+        <pc:picChg chg="mod">
+          <ac:chgData name="jérémie kuperblum" userId="ad9297b144f2de4c" providerId="LiveId" clId="{B87CA29C-9854-47B7-9329-B5CF03694B08}" dt="2021-02-12T08:07:37.074" v="12" actId="1076"/>
+          <ac:picMkLst>
+            <pc:docMk/>
+            <pc:sldMk cId="3086406202" sldId="256"/>
+            <ac:picMk id="126" creationId="{48EF8E71-C747-4096-813B-258D24E24214}"/>
+          </ac:picMkLst>
+        </pc:picChg>
+        <pc:picChg chg="mod">
+          <ac:chgData name="jérémie kuperblum" userId="ad9297b144f2de4c" providerId="LiveId" clId="{B87CA29C-9854-47B7-9329-B5CF03694B08}" dt="2021-02-12T08:07:40.549" v="13" actId="1076"/>
+          <ac:picMkLst>
+            <pc:docMk/>
+            <pc:sldMk cId="3086406202" sldId="256"/>
+            <ac:picMk id="127" creationId="{F87D1F9D-2FDE-4CE4-800E-F41268B6C2ED}"/>
+          </ac:picMkLst>
+        </pc:picChg>
+        <pc:picChg chg="mod">
+          <ac:chgData name="jérémie kuperblum" userId="ad9297b144f2de4c" providerId="LiveId" clId="{B87CA29C-9854-47B7-9329-B5CF03694B08}" dt="2021-02-12T08:07:44.652" v="14" actId="1076"/>
+          <ac:picMkLst>
+            <pc:docMk/>
+            <pc:sldMk cId="3086406202" sldId="256"/>
+            <ac:picMk id="128" creationId="{6497EC02-C46F-4C37-B733-0EC2DD479229}"/>
+          </ac:picMkLst>
+        </pc:picChg>
+        <pc:picChg chg="mod">
+          <ac:chgData name="jérémie kuperblum" userId="ad9297b144f2de4c" providerId="LiveId" clId="{B87CA29C-9854-47B7-9329-B5CF03694B08}" dt="2021-02-12T08:07:47.883" v="15" actId="1076"/>
+          <ac:picMkLst>
+            <pc:docMk/>
+            <pc:sldMk cId="3086406202" sldId="256"/>
+            <ac:picMk id="129" creationId="{365BD1CC-9670-464F-BB87-F40F123B34D9}"/>
+          </ac:picMkLst>
+        </pc:picChg>
+        <pc:picChg chg="mod">
+          <ac:chgData name="jérémie kuperblum" userId="ad9297b144f2de4c" providerId="LiveId" clId="{B87CA29C-9854-47B7-9329-B5CF03694B08}" dt="2021-02-12T08:11:13.430" v="108" actId="1076"/>
+          <ac:picMkLst>
+            <pc:docMk/>
+            <pc:sldMk cId="3086406202" sldId="256"/>
+            <ac:picMk id="130" creationId="{4C763570-1EA1-4460-A4FA-F6841575674B}"/>
+          </ac:picMkLst>
+        </pc:picChg>
+        <pc:picChg chg="mod">
+          <ac:chgData name="jérémie kuperblum" userId="ad9297b144f2de4c" providerId="LiveId" clId="{B87CA29C-9854-47B7-9329-B5CF03694B08}" dt="2021-02-12T08:07:58.121" v="18" actId="1076"/>
+          <ac:picMkLst>
+            <pc:docMk/>
+            <pc:sldMk cId="3086406202" sldId="256"/>
+            <ac:picMk id="132" creationId="{3B7C6024-39D2-4109-9EB0-C474419E7EFF}"/>
+          </ac:picMkLst>
+        </pc:picChg>
       </pc:sldChg>
     </pc:docChg>
   </pc:docChgLst>
@@ -1185,7 +1390,7 @@
           <a:p>
             <a:fld id="{6D246A4E-EA30-406F-B60A-30B895E3CA3E}" type="datetimeFigureOut">
               <a:rPr lang="fr-BE" smtClean="0"/>
-              <a:t>03-02-21</a:t>
+              <a:t>12-02-21</a:t>
             </a:fld>
             <a:endParaRPr lang="fr-BE"/>
           </a:p>
@@ -1385,7 +1590,7 @@
           <a:p>
             <a:fld id="{6D246A4E-EA30-406F-B60A-30B895E3CA3E}" type="datetimeFigureOut">
               <a:rPr lang="fr-BE" smtClean="0"/>
-              <a:t>03-02-21</a:t>
+              <a:t>12-02-21</a:t>
             </a:fld>
             <a:endParaRPr lang="fr-BE"/>
           </a:p>
@@ -1595,7 +1800,7 @@
           <a:p>
             <a:fld id="{6D246A4E-EA30-406F-B60A-30B895E3CA3E}" type="datetimeFigureOut">
               <a:rPr lang="fr-BE" smtClean="0"/>
-              <a:t>03-02-21</a:t>
+              <a:t>12-02-21</a:t>
             </a:fld>
             <a:endParaRPr lang="fr-BE"/>
           </a:p>
@@ -1795,7 +2000,7 @@
           <a:p>
             <a:fld id="{6D246A4E-EA30-406F-B60A-30B895E3CA3E}" type="datetimeFigureOut">
               <a:rPr lang="fr-BE" smtClean="0"/>
-              <a:t>03-02-21</a:t>
+              <a:t>12-02-21</a:t>
             </a:fld>
             <a:endParaRPr lang="fr-BE"/>
           </a:p>
@@ -2071,7 +2276,7 @@
           <a:p>
             <a:fld id="{6D246A4E-EA30-406F-B60A-30B895E3CA3E}" type="datetimeFigureOut">
               <a:rPr lang="fr-BE" smtClean="0"/>
-              <a:t>03-02-21</a:t>
+              <a:t>12-02-21</a:t>
             </a:fld>
             <a:endParaRPr lang="fr-BE"/>
           </a:p>
@@ -2339,7 +2544,7 @@
           <a:p>
             <a:fld id="{6D246A4E-EA30-406F-B60A-30B895E3CA3E}" type="datetimeFigureOut">
               <a:rPr lang="fr-BE" smtClean="0"/>
-              <a:t>03-02-21</a:t>
+              <a:t>12-02-21</a:t>
             </a:fld>
             <a:endParaRPr lang="fr-BE"/>
           </a:p>
@@ -2754,7 +2959,7 @@
           <a:p>
             <a:fld id="{6D246A4E-EA30-406F-B60A-30B895E3CA3E}" type="datetimeFigureOut">
               <a:rPr lang="fr-BE" smtClean="0"/>
-              <a:t>03-02-21</a:t>
+              <a:t>12-02-21</a:t>
             </a:fld>
             <a:endParaRPr lang="fr-BE"/>
           </a:p>
@@ -2896,7 +3101,7 @@
           <a:p>
             <a:fld id="{6D246A4E-EA30-406F-B60A-30B895E3CA3E}" type="datetimeFigureOut">
               <a:rPr lang="fr-BE" smtClean="0"/>
-              <a:t>03-02-21</a:t>
+              <a:t>12-02-21</a:t>
             </a:fld>
             <a:endParaRPr lang="fr-BE"/>
           </a:p>
@@ -3009,7 +3214,7 @@
           <a:p>
             <a:fld id="{6D246A4E-EA30-406F-B60A-30B895E3CA3E}" type="datetimeFigureOut">
               <a:rPr lang="fr-BE" smtClean="0"/>
-              <a:t>03-02-21</a:t>
+              <a:t>12-02-21</a:t>
             </a:fld>
             <a:endParaRPr lang="fr-BE"/>
           </a:p>
@@ -3322,7 +3527,7 @@
           <a:p>
             <a:fld id="{6D246A4E-EA30-406F-B60A-30B895E3CA3E}" type="datetimeFigureOut">
               <a:rPr lang="fr-BE" smtClean="0"/>
-              <a:t>03-02-21</a:t>
+              <a:t>12-02-21</a:t>
             </a:fld>
             <a:endParaRPr lang="fr-BE"/>
           </a:p>
@@ -3611,7 +3816,7 @@
           <a:p>
             <a:fld id="{6D246A4E-EA30-406F-B60A-30B895E3CA3E}" type="datetimeFigureOut">
               <a:rPr lang="fr-BE" smtClean="0"/>
-              <a:t>03-02-21</a:t>
+              <a:t>12-02-21</a:t>
             </a:fld>
             <a:endParaRPr lang="fr-BE"/>
           </a:p>
@@ -3854,7 +4059,7 @@
           <a:p>
             <a:fld id="{6D246A4E-EA30-406F-B60A-30B895E3CA3E}" type="datetimeFigureOut">
               <a:rPr lang="fr-BE" smtClean="0"/>
-              <a:t>03-02-21</a:t>
+              <a:t>12-02-21</a:t>
             </a:fld>
             <a:endParaRPr lang="fr-BE"/>
           </a:p>
@@ -4455,7 +4660,7 @@
         </p:blipFill>
         <p:spPr>
           <a:xfrm>
-            <a:off x="4437" y="0"/>
+            <a:off x="0" y="0"/>
             <a:ext cx="12194267" cy="6857999"/>
           </a:xfrm>
           <a:prstGeom prst="rect">
@@ -5125,7 +5330,7 @@
                   <a:schemeClr val="tx1"/>
                 </a:solidFill>
               </a:rPr>
-              <a:t>Mes amies</a:t>
+              <a:t>Mes amis</a:t>
             </a:r>
           </a:p>
         </p:txBody>
@@ -5617,7 +5822,7 @@
                   <a:schemeClr val="bg1"/>
                 </a:solidFill>
               </a:rPr>
-              <a:t>1°</a:t>
+              <a:t>1</a:t>
             </a:r>
           </a:p>
         </p:txBody>
@@ -5656,7 +5861,7 @@
                   <a:schemeClr val="bg1"/>
                 </a:solidFill>
               </a:rPr>
-              <a:t>0,6°</a:t>
+              <a:t>0,6</a:t>
             </a:r>
           </a:p>
         </p:txBody>
@@ -5695,7 +5900,7 @@
                   <a:schemeClr val="bg1"/>
                 </a:solidFill>
               </a:rPr>
-              <a:t>0,6°</a:t>
+              <a:t>0,6</a:t>
             </a:r>
           </a:p>
         </p:txBody>
@@ -5734,7 +5939,7 @@
                   <a:schemeClr val="bg1"/>
                 </a:solidFill>
               </a:rPr>
-              <a:t>0,4°</a:t>
+              <a:t>0,4</a:t>
             </a:r>
           </a:p>
         </p:txBody>
@@ -5940,7 +6145,7 @@
                   <a:schemeClr val="bg1"/>
                 </a:solidFill>
               </a:rPr>
-              <a:t>0°</a:t>
+              <a:t>0</a:t>
             </a:r>
           </a:p>
         </p:txBody>
@@ -5990,7 +6195,7 @@
                   <a:schemeClr val="bg1"/>
                 </a:solidFill>
               </a:rPr>
-              <a:t> 0,5°</a:t>
+              <a:t> 0,5</a:t>
             </a:r>
           </a:p>
         </p:txBody>
@@ -6040,7 +6245,7 @@
                   <a:schemeClr val="bg1"/>
                 </a:solidFill>
               </a:rPr>
-              <a:t> 1°</a:t>
+              <a:t> 1</a:t>
             </a:r>
           </a:p>
         </p:txBody>
@@ -6340,7 +6545,7 @@
                   <a:schemeClr val="bg1"/>
                 </a:solidFill>
               </a:rPr>
-              <a:t>4 Jupière 25 cl, 5 °</a:t>
+              <a:t>4 Jupiler 25 cl, 5 °</a:t>
             </a:r>
           </a:p>
         </p:txBody>
@@ -7375,7 +7580,7 @@
         </p:nvSpPr>
         <p:spPr>
           <a:xfrm>
-            <a:off x="3913217" y="1644273"/>
+            <a:off x="3953308" y="1643065"/>
             <a:ext cx="747540" cy="169277"/>
           </a:xfrm>
           <a:prstGeom prst="rect">
@@ -7396,7 +7601,7 @@
                 </a:solidFill>
                 <a:latin typeface="Century Schoolbook" panose="02040604050505020304" pitchFamily="18" charset="0"/>
               </a:rPr>
-              <a:t>Boissons buent :</a:t>
+              <a:t>Boissons bues :</a:t>
             </a:r>
           </a:p>
         </p:txBody>
@@ -7445,7 +7650,7 @@
             <a:pPr algn="ctr"/>
             <a:r>
               <a:rPr lang="fr-BE" sz="400" b="1" dirty="0"/>
-              <a:t>Voir les photos prisent avec l’heure et le lieux</a:t>
+              <a:t>Voir les photos prises avec l’heure et le lieu</a:t>
             </a:r>
           </a:p>
         </p:txBody>
@@ -7913,8 +8118,12 @@
           <a:lstStyle/>
           <a:p>
             <a:r>
+              <a:rPr lang="fr-BE" sz="1100"/>
+              <a:t>Mot </a:t>
+            </a:r>
+            <a:r>
               <a:rPr lang="fr-BE" sz="1100" dirty="0"/>
-              <a:t>Mots de passe : _____</a:t>
+              <a:t>de passe : _____</a:t>
             </a:r>
           </a:p>
         </p:txBody>
@@ -8353,7 +8562,7 @@
         <p:spPr>
           <a:xfrm>
             <a:off x="6968867" y="2466581"/>
-            <a:ext cx="4633107" cy="3862596"/>
+            <a:ext cx="4633107" cy="3939540"/>
           </a:xfrm>
           <a:prstGeom prst="rect">
             <a:avLst/>
@@ -8370,7 +8579,7 @@
               <a:rPr lang="fr-BE" sz="1100" dirty="0">
                 <a:latin typeface="Century Schoolbook" panose="02040604050505020304" pitchFamily="18" charset="0"/>
               </a:rPr>
-              <a:t>Drink-drink est une application vous permettant de savoir en temps réelle la quantité d’alcool approximatif que vous avez dans votre sang.</a:t>
+              <a:t>Drink-drink est une application vous permettant de savoir en temps réel la quantité d’alcool approximatif que vous avez dans votre sang.</a:t>
             </a:r>
           </a:p>
           <a:p>
@@ -8422,7 +8631,7 @@
               <a:rPr lang="fr-BE" sz="800" dirty="0">
                 <a:latin typeface="Century Schoolbook" panose="02040604050505020304" pitchFamily="18" charset="0"/>
               </a:rPr>
-              <a:t>Connaitre l’état d’ivresse de vos amis faisant partie de la « soirée ».</a:t>
+              <a:t>Rejoindre des amis dans une « soirée » via NFC</a:t>
             </a:r>
           </a:p>
           <a:p>
@@ -8435,7 +8644,7 @@
               <a:rPr lang="fr-BE" sz="800" dirty="0">
                 <a:latin typeface="Century Schoolbook" panose="02040604050505020304" pitchFamily="18" charset="0"/>
               </a:rPr>
-              <a:t>Avoir un historique de vos soirées où vous trouverez des graphiques sur la quantité d’alcool dans votre sang en fonction du temps, la quantité de boissons buent et leur « type », les photos prises avec l’heure et le lieux.</a:t>
+              <a:t>Connaitre l’état d’ivresse de vos amis faisant partie de la « soirée ».</a:t>
             </a:r>
           </a:p>
           <a:p>
@@ -8448,13 +8657,13 @@
               <a:rPr lang="fr-BE" sz="800" dirty="0">
                 <a:latin typeface="Century Schoolbook" panose="02040604050505020304" pitchFamily="18" charset="0"/>
               </a:rPr>
-              <a:t>La possibilité de « rejouer » votre soirée où l’application vous montre l’enchainement des actions que vous avez fait durant </a:t>
+              <a:t>Avoir un historique de vos soirées où vous trouverez des graphiques sur la quantité d’alcool dans votre sang en fonction du temps, la quantité de boissons bues et leur « type », les photos prises avec l’heure et </a:t>
             </a:r>
             <a:r>
               <a:rPr lang="fr-BE" sz="800">
                 <a:latin typeface="Century Schoolbook" panose="02040604050505020304" pitchFamily="18" charset="0"/>
               </a:rPr>
-              <a:t>la soirée.</a:t>
+              <a:t>le lieu.</a:t>
             </a:r>
             <a:endParaRPr lang="fr-BE" sz="800" dirty="0">
               <a:latin typeface="Century Schoolbook" panose="02040604050505020304" pitchFamily="18" charset="0"/>
@@ -8470,7 +8679,20 @@
               <a:rPr lang="fr-BE" sz="800" dirty="0">
                 <a:latin typeface="Century Schoolbook" panose="02040604050505020304" pitchFamily="18" charset="0"/>
               </a:rPr>
-              <a:t>16h : photo, 16h10 : Jupière 25 cl à 5°, 17h : vodka/Red bull 33cl à 13 °, …</a:t>
+              <a:t>La possibilité de « rejouer » votre soirée où l’application vous montre l’enchainement des actions que vous avez fait durant la soirée.</a:t>
+            </a:r>
+          </a:p>
+          <a:p>
+            <a:endParaRPr lang="fr-BE" sz="800" dirty="0">
+              <a:latin typeface="Century Schoolbook" panose="02040604050505020304" pitchFamily="18" charset="0"/>
+            </a:endParaRPr>
+          </a:p>
+          <a:p>
+            <a:r>
+              <a:rPr lang="fr-BE" sz="800" dirty="0">
+                <a:latin typeface="Century Schoolbook" panose="02040604050505020304" pitchFamily="18" charset="0"/>
+              </a:rPr>
+              <a:t>16h : photo, 16h10 : Jupiler 25 cl à 5°, 17h : vodka/Red bull 33cl à 13 °, …</a:t>
             </a:r>
           </a:p>
           <a:p>
@@ -8542,7 +8764,7 @@
         </p:blipFill>
         <p:spPr>
           <a:xfrm rot="16200000">
-            <a:off x="6875415" y="3444085"/>
+            <a:off x="6865525" y="3298021"/>
             <a:ext cx="241928" cy="241928"/>
           </a:xfrm>
           <a:prstGeom prst="rect">
@@ -8581,7 +8803,7 @@
         </p:blipFill>
         <p:spPr>
           <a:xfrm rot="16200000">
-            <a:off x="6865525" y="3828561"/>
+            <a:off x="6855734" y="3661613"/>
             <a:ext cx="241928" cy="241928"/>
           </a:xfrm>
           <a:prstGeom prst="rect">
@@ -8620,7 +8842,7 @@
         </p:blipFill>
         <p:spPr>
           <a:xfrm rot="16200000">
-            <a:off x="6865791" y="4081943"/>
+            <a:off x="6865525" y="3917239"/>
             <a:ext cx="241928" cy="241928"/>
           </a:xfrm>
           <a:prstGeom prst="rect">
@@ -8659,7 +8881,7 @@
         </p:blipFill>
         <p:spPr>
           <a:xfrm rot="16200000">
-            <a:off x="6875415" y="4320558"/>
+            <a:off x="6863257" y="4155151"/>
             <a:ext cx="241928" cy="241928"/>
           </a:xfrm>
           <a:prstGeom prst="rect">
@@ -8698,7 +8920,7 @@
         </p:blipFill>
         <p:spPr>
           <a:xfrm rot="16200000">
-            <a:off x="6875415" y="4809129"/>
+            <a:off x="6870400" y="4401105"/>
             <a:ext cx="241928" cy="241928"/>
           </a:xfrm>
           <a:prstGeom prst="rect">
@@ -8737,7 +8959,7 @@
         </p:blipFill>
         <p:spPr>
           <a:xfrm rot="16200000">
-            <a:off x="6875415" y="5409685"/>
+            <a:off x="6870400" y="5256647"/>
             <a:ext cx="241928" cy="241928"/>
           </a:xfrm>
           <a:prstGeom prst="rect">
@@ -8776,8 +8998,47 @@
         </p:blipFill>
         <p:spPr>
           <a:xfrm rot="17731854">
-            <a:off x="6867482" y="5048353"/>
+            <a:off x="6871608" y="4750923"/>
             <a:ext cx="260465" cy="260465"/>
+          </a:xfrm>
+          <a:prstGeom prst="rect">
+            <a:avLst/>
+          </a:prstGeom>
+        </p:spPr>
+      </p:pic>
+      <p:pic>
+        <p:nvPicPr>
+          <p:cNvPr id="97" name="Graphique 96" descr="Point d’insertion vers le bas avec un remplissage uni">
+            <a:extLst>
+              <a:ext uri="{FF2B5EF4-FFF2-40B4-BE49-F238E27FC236}">
+                <a16:creationId xmlns:a16="http://schemas.microsoft.com/office/drawing/2014/main" id="{984DE0A4-93D1-403C-881B-8D8B6A10C41F}"/>
+              </a:ext>
+            </a:extLst>
+          </p:cNvPr>
+          <p:cNvPicPr>
+            <a:picLocks noChangeAspect="1"/>
+          </p:cNvPicPr>
+          <p:nvPr/>
+        </p:nvPicPr>
+        <p:blipFill>
+          <a:blip r:embed="rId12">
+            <a:extLst>
+              <a:ext uri="{28A0092B-C50C-407E-A947-70E740481C1C}">
+                <a14:useLocalDpi xmlns:a14="http://schemas.microsoft.com/office/drawing/2010/main" val="0"/>
+              </a:ext>
+              <a:ext uri="{96DAC541-7B7A-43D3-8B79-37D633B846F1}">
+                <asvg:svgBlip xmlns:asvg="http://schemas.microsoft.com/office/drawing/2016/SVG/main" r:embed="rId13"/>
+              </a:ext>
+            </a:extLst>
+          </a:blip>
+          <a:stretch>
+            <a:fillRect/>
+          </a:stretch>
+        </p:blipFill>
+        <p:spPr>
+          <a:xfrm rot="16200000">
+            <a:off x="6870400" y="5498363"/>
+            <a:ext cx="241928" cy="241928"/>
           </a:xfrm>
           <a:prstGeom prst="rect">
             <a:avLst/>

</xml_diff>